<commit_message>
Changes in develop version
</commit_message>
<xml_diff>
--- a/document/ElasticSearch.pptx
+++ b/document/ElasticSearch.pptx
@@ -34,11 +34,10 @@
     <p:sldId id="284" r:id="rId28"/>
     <p:sldId id="285" r:id="rId29"/>
     <p:sldId id="286" r:id="rId30"/>
-    <p:sldId id="287" r:id="rId31"/>
-    <p:sldId id="288" r:id="rId32"/>
-    <p:sldId id="289" r:id="rId33"/>
-    <p:sldId id="290" r:id="rId34"/>
-    <p:sldId id="281" r:id="rId35"/>
+    <p:sldId id="288" r:id="rId31"/>
+    <p:sldId id="289" r:id="rId32"/>
+    <p:sldId id="290" r:id="rId33"/>
+    <p:sldId id="281" r:id="rId34"/>
   </p:sldIdLst>
   <p:sldSz cx="9144000" cy="6858000" type="screen4x3"/>
   <p:notesSz cx="6858000" cy="9144000"/>
@@ -18603,8 +18602,8 @@
         </p:blipFill>
         <p:spPr>
           <a:xfrm>
-            <a:off x="3192065" y="4207510"/>
-            <a:ext cx="1916700" cy="1969453"/>
+            <a:off x="3192065" y="4437113"/>
+            <a:ext cx="1916700" cy="1512168"/>
           </a:xfrm>
           <a:prstGeom prst="rect">
             <a:avLst/>
@@ -18840,7 +18839,15 @@
             </a:pPr>
             <a:r>
               <a:rPr lang="es-ES" dirty="0" smtClean="0"/>
-              <a:t>Identifica la actividad de red o algún comportamiento inusual de algún usuario a los atacantes antes de que causen daño.</a:t>
+              <a:t>Sea notificado si hay un aumento inusual por ejemplo en carritos abandonados de la compra en su sitio del e-</a:t>
+            </a:r>
+            <a:r>
+              <a:rPr lang="es-ES" dirty="0" err="1" smtClean="0"/>
+              <a:t>commerce</a:t>
+            </a:r>
+            <a:r>
+              <a:rPr lang="es-ES" dirty="0" smtClean="0"/>
+              <a:t>.</a:t>
             </a:r>
             <a:endParaRPr lang="en-US" dirty="0"/>
           </a:p>
@@ -18848,7 +18855,7 @@
       </p:sp>
       <p:pic>
         <p:nvPicPr>
-          <p:cNvPr id="5" name="Imagen 4"/>
+          <p:cNvPr id="4" name="Imagen 3"/>
           <p:cNvPicPr>
             <a:picLocks noChangeAspect="1"/>
           </p:cNvPicPr>
@@ -18862,8 +18869,8 @@
         </p:blipFill>
         <p:spPr>
           <a:xfrm>
-            <a:off x="3192065" y="4509120"/>
-            <a:ext cx="1916700" cy="1969453"/>
+            <a:off x="3131840" y="4725144"/>
+            <a:ext cx="1702256" cy="1558229"/>
           </a:xfrm>
           <a:prstGeom prst="rect">
             <a:avLst/>
@@ -18873,7 +18880,7 @@
     </p:spTree>
     <p:extLst>
       <p:ext uri="{BB962C8B-B14F-4D97-AF65-F5344CB8AC3E}">
-        <p14:creationId xmlns:p14="http://schemas.microsoft.com/office/powerpoint/2010/main" val="3246929634"/>
+        <p14:creationId xmlns:p14="http://schemas.microsoft.com/office/powerpoint/2010/main" val="985854399"/>
       </p:ext>
     </p:extLst>
   </p:cSld>
@@ -18941,7 +18948,9 @@
         </p:nvSpPr>
         <p:spPr/>
         <p:txBody>
-          <a:bodyPr/>
+          <a:bodyPr>
+            <a:normAutofit fontScale="92500" lnSpcReduction="10000"/>
+          </a:bodyPr>
           <a:lstStyle/>
           <a:p>
             <a:pPr marL="0" indent="0">
@@ -18954,24 +18963,36 @@
               <a:buNone/>
             </a:pPr>
             <a:r>
+              <a:rPr lang="en-US" b="1" dirty="0" err="1" smtClean="0"/>
+              <a:t>Modela</a:t>
+            </a:r>
+            <a:r>
               <a:rPr lang="en-US" b="1" dirty="0" smtClean="0"/>
-              <a:t>An</a:t>
-            </a:r>
-            <a:r>
-              <a:rPr lang="es-BO" b="1" dirty="0" smtClean="0"/>
-              <a:t>á</a:t>
+              <a:t> </a:t>
             </a:r>
             <a:r>
               <a:rPr lang="en-US" b="1" dirty="0" err="1" smtClean="0"/>
-              <a:t>lisis</a:t>
+              <a:t>automaticamente</a:t>
             </a:r>
             <a:r>
               <a:rPr lang="en-US" b="1" dirty="0" smtClean="0"/>
-              <a:t> de </a:t>
+              <a:t> la </a:t>
             </a:r>
             <a:r>
               <a:rPr lang="en-US" b="1" dirty="0" err="1" smtClean="0"/>
-              <a:t>negocio</a:t>
+              <a:t>complejidad</a:t>
+            </a:r>
+            <a:r>
+              <a:rPr lang="en-US" b="1" dirty="0" smtClean="0"/>
+              <a:t> del </a:t>
+            </a:r>
+            <a:r>
+              <a:rPr lang="en-US" b="1" dirty="0" err="1" smtClean="0"/>
+              <a:t>mundo</a:t>
+            </a:r>
+            <a:r>
+              <a:rPr lang="en-US" b="1" dirty="0" smtClean="0"/>
+              <a:t> real</a:t>
             </a:r>
             <a:endParaRPr lang="en-US" b="1" dirty="0"/>
           </a:p>
@@ -18981,48 +19002,16 @@
             </a:pPr>
             <a:r>
               <a:rPr lang="es-ES" dirty="0" smtClean="0"/>
-              <a:t>Sea notificado si hay un aumento inusual por ejemplo en carritos abandonados de la compra en su sitio del e-</a:t>
-            </a:r>
-            <a:r>
-              <a:rPr lang="es-ES" dirty="0" err="1" smtClean="0"/>
-              <a:t>commerce</a:t>
-            </a:r>
-            <a:r>
-              <a:rPr lang="es-ES" dirty="0" smtClean="0"/>
-              <a:t>.</a:t>
+              <a:t>El tráfico del blog se sumerge en las noches y los fines de semana. Los productos populares tienen ventas crecientes con el tiempo. Tasas de conversión de impacto de ubicación y hora del día. Las funciones de aprendizaje de X-Pack aprenden el comportamiento normal de sus datos, todo por sí mismo</a:t>
             </a:r>
             <a:endParaRPr lang="en-US" dirty="0"/>
           </a:p>
         </p:txBody>
       </p:sp>
-      <p:pic>
-        <p:nvPicPr>
-          <p:cNvPr id="4" name="Imagen 3"/>
-          <p:cNvPicPr>
-            <a:picLocks noChangeAspect="1"/>
-          </p:cNvPicPr>
-          <p:nvPr/>
-        </p:nvPicPr>
-        <p:blipFill>
-          <a:blip r:embed="rId2"/>
-          <a:stretch>
-            <a:fillRect/>
-          </a:stretch>
-        </p:blipFill>
-        <p:spPr>
-          <a:xfrm>
-            <a:off x="3131840" y="4725144"/>
-            <a:ext cx="1702256" cy="1558229"/>
-          </a:xfrm>
-          <a:prstGeom prst="rect">
-            <a:avLst/>
-          </a:prstGeom>
-        </p:spPr>
-      </p:pic>
     </p:spTree>
     <p:extLst>
       <p:ext uri="{BB962C8B-B14F-4D97-AF65-F5344CB8AC3E}">
-        <p14:creationId xmlns:p14="http://schemas.microsoft.com/office/powerpoint/2010/main" val="985854399"/>
+        <p14:creationId xmlns:p14="http://schemas.microsoft.com/office/powerpoint/2010/main" val="3616473433"/>
       </p:ext>
     </p:extLst>
   </p:cSld>
@@ -19091,137 +19080,6 @@
         <p:spPr/>
         <p:txBody>
           <a:bodyPr>
-            <a:normAutofit fontScale="92500" lnSpcReduction="10000"/>
-          </a:bodyPr>
-          <a:lstStyle/>
-          <a:p>
-            <a:pPr marL="0" indent="0">
-              <a:buNone/>
-            </a:pPr>
-            <a:endParaRPr lang="es-BO" b="1" dirty="0" smtClean="0"/>
-          </a:p>
-          <a:p>
-            <a:pPr marL="0" indent="0">
-              <a:buNone/>
-            </a:pPr>
-            <a:r>
-              <a:rPr lang="en-US" b="1" dirty="0" err="1" smtClean="0"/>
-              <a:t>Modela</a:t>
-            </a:r>
-            <a:r>
-              <a:rPr lang="en-US" b="1" dirty="0" smtClean="0"/>
-              <a:t> </a:t>
-            </a:r>
-            <a:r>
-              <a:rPr lang="en-US" b="1" dirty="0" err="1" smtClean="0"/>
-              <a:t>automaticamente</a:t>
-            </a:r>
-            <a:r>
-              <a:rPr lang="en-US" b="1" dirty="0" smtClean="0"/>
-              <a:t> la </a:t>
-            </a:r>
-            <a:r>
-              <a:rPr lang="en-US" b="1" dirty="0" err="1" smtClean="0"/>
-              <a:t>complejidad</a:t>
-            </a:r>
-            <a:r>
-              <a:rPr lang="en-US" b="1" dirty="0" smtClean="0"/>
-              <a:t> del </a:t>
-            </a:r>
-            <a:r>
-              <a:rPr lang="en-US" b="1" dirty="0" err="1" smtClean="0"/>
-              <a:t>mundo</a:t>
-            </a:r>
-            <a:r>
-              <a:rPr lang="en-US" b="1" dirty="0" smtClean="0"/>
-              <a:t> real</a:t>
-            </a:r>
-            <a:endParaRPr lang="en-US" b="1" dirty="0"/>
-          </a:p>
-          <a:p>
-            <a:pPr marL="0" indent="0">
-              <a:buNone/>
-            </a:pPr>
-            <a:r>
-              <a:rPr lang="es-ES" dirty="0" smtClean="0"/>
-              <a:t>El tráfico del blog se sumerge en las noches y los fines de semana. Los productos populares tienen ventas crecientes con el tiempo. Tasas de conversión de impacto de ubicación y hora del día. Las funciones de aprendizaje de X-Pack aprenden el comportamiento normal de sus datos, todo por sí mismo</a:t>
-            </a:r>
-            <a:endParaRPr lang="en-US" dirty="0"/>
-          </a:p>
-        </p:txBody>
-      </p:sp>
-    </p:spTree>
-    <p:extLst>
-      <p:ext uri="{BB962C8B-B14F-4D97-AF65-F5344CB8AC3E}">
-        <p14:creationId xmlns:p14="http://schemas.microsoft.com/office/powerpoint/2010/main" val="3616473433"/>
-      </p:ext>
-    </p:extLst>
-  </p:cSld>
-  <p:clrMapOvr>
-    <a:masterClrMapping/>
-  </p:clrMapOvr>
-</p:sld>
-</file>
-
-<file path=ppt/slides/slide33.xml><?xml version="1.0" encoding="utf-8"?>
-<p:sld xmlns:a="http://schemas.openxmlformats.org/drawingml/2006/main" xmlns:r="http://schemas.openxmlformats.org/officeDocument/2006/relationships" xmlns:p="http://schemas.openxmlformats.org/presentationml/2006/main">
-  <p:cSld>
-    <p:spTree>
-      <p:nvGrpSpPr>
-        <p:cNvPr id="1" name=""/>
-        <p:cNvGrpSpPr/>
-        <p:nvPr/>
-      </p:nvGrpSpPr>
-      <p:grpSpPr>
-        <a:xfrm>
-          <a:off x="0" y="0"/>
-          <a:ext cx="0" cy="0"/>
-          <a:chOff x="0" y="0"/>
-          <a:chExt cx="0" cy="0"/>
-        </a:xfrm>
-      </p:grpSpPr>
-      <p:sp>
-        <p:nvSpPr>
-          <p:cNvPr id="2" name="Título 1"/>
-          <p:cNvSpPr>
-            <a:spLocks noGrp="1"/>
-          </p:cNvSpPr>
-          <p:nvPr>
-            <p:ph type="title"/>
-          </p:nvPr>
-        </p:nvSpPr>
-        <p:spPr/>
-        <p:txBody>
-          <a:bodyPr>
-            <a:normAutofit fontScale="90000"/>
-          </a:bodyPr>
-          <a:lstStyle/>
-          <a:p>
-            <a:r>
-              <a:rPr lang="en-US" dirty="0" err="1" smtClean="0"/>
-              <a:t>Elasticsearch</a:t>
-            </a:r>
-            <a:r>
-              <a:rPr lang="en-US" dirty="0" smtClean="0"/>
-              <a:t> Machine Learning</a:t>
-            </a:r>
-            <a:endParaRPr lang="en-US" dirty="0"/>
-          </a:p>
-        </p:txBody>
-      </p:sp>
-      <p:sp>
-        <p:nvSpPr>
-          <p:cNvPr id="3" name="Marcador de contenido 2"/>
-          <p:cNvSpPr>
-            <a:spLocks noGrp="1"/>
-          </p:cNvSpPr>
-          <p:nvPr>
-            <p:ph idx="1"/>
-          </p:nvPr>
-        </p:nvSpPr>
-        <p:spPr/>
-        <p:txBody>
-          <a:bodyPr>
             <a:normAutofit fontScale="85000" lnSpcReduction="20000"/>
           </a:bodyPr>
           <a:lstStyle/>
@@ -19315,7 +19173,7 @@
 </p:sld>
 </file>
 
-<file path=ppt/slides/slide34.xml><?xml version="1.0" encoding="utf-8"?>
+<file path=ppt/slides/slide33.xml><?xml version="1.0" encoding="utf-8"?>
 <p:sld xmlns:a="http://schemas.openxmlformats.org/drawingml/2006/main" xmlns:r="http://schemas.openxmlformats.org/officeDocument/2006/relationships" xmlns:p="http://schemas.openxmlformats.org/presentationml/2006/main">
   <p:cSld>
     <p:spTree>
@@ -19446,6 +19304,50 @@
               </a:rPr>
               <a:t>github.com/elastic/elasticsearch</a:t>
             </a:r>
+            <a:endParaRPr lang="en-US" sz="1600" dirty="0"/>
+          </a:p>
+          <a:p>
+            <a:endParaRPr lang="es-BO" sz="1600" dirty="0" smtClean="0"/>
+          </a:p>
+          <a:p>
+            <a:r>
+              <a:rPr lang="en-US" sz="1600" dirty="0"/>
+              <a:t>Elasticsearch. (2011). Machine Learning. </a:t>
+            </a:r>
+            <a:r>
+              <a:rPr lang="en-US" sz="1600" dirty="0" err="1"/>
+              <a:t>junio</a:t>
+            </a:r>
+            <a:r>
+              <a:rPr lang="en-US" sz="1600" dirty="0"/>
+              <a:t> 2011, de Elasticsearch x-pack </a:t>
+            </a:r>
+            <a:r>
+              <a:rPr lang="en-US" sz="1600" dirty="0" err="1"/>
+              <a:t>Sitio</a:t>
+            </a:r>
+            <a:r>
+              <a:rPr lang="en-US" sz="1600" dirty="0"/>
+              <a:t> web: </a:t>
+            </a:r>
+            <a:r>
+              <a:rPr lang="en-US" sz="1600" dirty="0">
+                <a:hlinkClick r:id="rId4"/>
+              </a:rPr>
+              <a:t>https://</a:t>
+            </a:r>
+            <a:r>
+              <a:rPr lang="en-US" sz="1600" dirty="0" smtClean="0">
+                <a:hlinkClick r:id="rId4"/>
+              </a:rPr>
+              <a:t>www.elastic.co/products/x-pack/machine-learning</a:t>
+            </a:r>
+            <a:endParaRPr lang="en-US" sz="1600" dirty="0" smtClean="0"/>
+          </a:p>
+          <a:p>
+            <a:pPr marL="68580" indent="0">
+              <a:buNone/>
+            </a:pPr>
             <a:endParaRPr lang="en-US" sz="1600" dirty="0" smtClean="0"/>
           </a:p>
           <a:p>

</xml_diff>